<commit_message>
support debian package build script, update icon
</commit_message>
<xml_diff>
--- a/logo_design.pptx
+++ b/logo_design.pptx
@@ -4241,12 +4241,12 @@
         </p:nvSpPr>
         <p:spPr>
           <a:xfrm>
-            <a:off x="2910205" y="243205"/>
+            <a:off x="2786380" y="243205"/>
             <a:ext cx="6371590" cy="6371590"/>
           </a:xfrm>
           <a:prstGeom prst="roundRect">
             <a:avLst>
-              <a:gd name="adj" fmla="val 12053"/>
+              <a:gd name="adj" fmla="val 24735"/>
             </a:avLst>
           </a:prstGeom>
           <a:solidFill>
@@ -4288,8 +4288,8 @@
         </p:nvGrpSpPr>
         <p:grpSpPr>
           <a:xfrm>
-            <a:off x="3999865" y="1152525"/>
-            <a:ext cx="4192270" cy="4582160"/>
+            <a:off x="4138295" y="1424305"/>
+            <a:ext cx="3667760" cy="4009390"/>
             <a:chOff x="7019" y="4762"/>
             <a:chExt cx="2238" cy="2446"/>
           </a:xfrm>

</xml_diff>